<commit_message>
improved conclusion and edited some readme format
</commit_message>
<xml_diff>
--- a/AIStocksProject/Presentation-Tech Giants Face-Off - Group 3.pptx
+++ b/AIStocksProject/Presentation-Tech Giants Face-Off - Group 3.pptx
@@ -267,7 +267,7 @@
   </p:defaultTextStyle>
   <p:extLst>
     <p:ext uri="GoogleSlidesCustomDataVersion2">
-      <go:slidesCustomData xmlns:go="http://customooxmlschemas.google.com/" r:id="rId32" roundtripDataSignature="AMtx7mieapGOM8P67G0torrPg1Tv0K6bSQ=="/>
+      <go:slidesCustomData xmlns:go="http://customooxmlschemas.google.com/" r:id="rId32" roundtripDataSignature="AMtx7mjqtzwJjDA1SL6CmJddyUWFl667dg=="/>
     </p:ext>
   </p:extLst>
 </p:presentation>
@@ -14734,7 +14734,7 @@
                 <a:cs typeface="Avenir"/>
                 <a:sym typeface="Avenir"/>
               </a:rPr>
-              <a:t> This finding suggests no statistically significant difference in overall risk between the AI companies and the S&amp;P 500 and Dow Jones indexes.</a:t>
+              <a:t> This finding suggests no statistically significant difference in overall risk between the AI companies and the S&amp;P 500 and Dow Jones indices.</a:t>
             </a:r>
             <a:endParaRPr sz="1500">
               <a:solidFill>
@@ -16318,7 +16318,7 @@
             <a:tbl>
               <a:tblPr>
                 <a:noFill/>
-                <a:tableStyleId>{E6AEE7F4-BF12-4FB1-AF91-F3454B1C920D}</a:tableStyleId>
+                <a:tableStyleId>{D1C5A9A2-9897-45D0-B2BE-17C51DF6B12C}</a:tableStyleId>
               </a:tblPr>
               <a:tblGrid>
                 <a:gridCol w="3162925"/>
@@ -17427,7 +17427,7 @@
             <a:tbl>
               <a:tblPr>
                 <a:noFill/>
-                <a:tableStyleId>{E6AEE7F4-BF12-4FB1-AF91-F3454B1C920D}</a:tableStyleId>
+                <a:tableStyleId>{D1C5A9A2-9897-45D0-B2BE-17C51DF6B12C}</a:tableStyleId>
               </a:tblPr>
               <a:tblGrid>
                 <a:gridCol w="2571750"/>
@@ -18640,13 +18640,157 @@
           <p:cNvPr id="240" name="Google Shape;240;p15"/>
           <p:cNvSpPr txBox="1"/>
           <p:nvPr>
+            <p:ph idx="1" type="body"/>
+          </p:nvPr>
+        </p:nvSpPr>
+        <p:spPr>
+          <a:xfrm>
+            <a:off x="905250" y="933275"/>
+            <a:ext cx="10381500" cy="5344500"/>
+          </a:xfrm>
+          <a:prstGeom prst="rect">
+            <a:avLst/>
+          </a:prstGeom>
+          <a:solidFill>
+            <a:srgbClr val="F7DBB9"/>
+          </a:solidFill>
+          <a:ln>
+            <a:noFill/>
+          </a:ln>
+        </p:spPr>
+        <p:txBody>
+          <a:bodyPr anchorCtr="0" anchor="ctr" bIns="45700" lIns="91425" spcFirstLastPara="1" rIns="91425" wrap="square" tIns="45700">
+            <a:normAutofit lnSpcReduction="10000"/>
+          </a:bodyPr>
+          <a:lstStyle/>
+          <a:p>
+            <a:pPr indent="0" lvl="0" marL="0" rtl="0" algn="ctr">
+              <a:lnSpc>
+                <a:spcPct val="150000"/>
+              </a:lnSpc>
+              <a:spcBef>
+                <a:spcPts val="1200"/>
+              </a:spcBef>
+              <a:spcAft>
+                <a:spcPts val="0"/>
+              </a:spcAft>
+              <a:buNone/>
+            </a:pPr>
+            <a:r>
+              <a:rPr lang="en-US" sz="3000">
+                <a:solidFill>
+                  <a:schemeClr val="dk1"/>
+                </a:solidFill>
+                <a:latin typeface="Arial"/>
+                <a:ea typeface="Arial"/>
+                <a:cs typeface="Arial"/>
+                <a:sym typeface="Arial"/>
+              </a:rPr>
+              <a:t>Our analysis shows that while AI companies have strong returns and generally low volatility; they do not outperform or display lower risk than the S&amp;P 500 and Dow Jones </a:t>
+            </a:r>
+            <a:r>
+              <a:rPr lang="en-US" sz="3000">
+                <a:solidFill>
+                  <a:schemeClr val="dk1"/>
+                </a:solidFill>
+                <a:latin typeface="Arial"/>
+                <a:ea typeface="Arial"/>
+                <a:cs typeface="Arial"/>
+                <a:sym typeface="Arial"/>
+              </a:rPr>
+              <a:t>indices consistently.</a:t>
+            </a:r>
+            <a:endParaRPr sz="3000">
+              <a:solidFill>
+                <a:schemeClr val="dk1"/>
+              </a:solidFill>
+              <a:latin typeface="Arial"/>
+              <a:ea typeface="Arial"/>
+              <a:cs typeface="Arial"/>
+              <a:sym typeface="Arial"/>
+            </a:endParaRPr>
+          </a:p>
+          <a:p>
+            <a:pPr indent="0" lvl="0" marL="0" rtl="0" algn="ctr">
+              <a:lnSpc>
+                <a:spcPct val="150000"/>
+              </a:lnSpc>
+              <a:spcBef>
+                <a:spcPts val="1200"/>
+              </a:spcBef>
+              <a:spcAft>
+                <a:spcPts val="0"/>
+              </a:spcAft>
+              <a:buNone/>
+            </a:pPr>
+            <a:r>
+              <a:rPr lang="en-US" sz="3000">
+                <a:solidFill>
+                  <a:schemeClr val="dk1"/>
+                </a:solidFill>
+                <a:latin typeface="Arial"/>
+                <a:ea typeface="Arial"/>
+                <a:cs typeface="Arial"/>
+                <a:sym typeface="Arial"/>
+              </a:rPr>
+              <a:t>Since any difference is largely </a:t>
+            </a:r>
+            <a:r>
+              <a:rPr lang="en-US" sz="3000">
+                <a:solidFill>
+                  <a:schemeClr val="dk1"/>
+                </a:solidFill>
+                <a:latin typeface="Arial"/>
+                <a:ea typeface="Arial"/>
+                <a:cs typeface="Arial"/>
+                <a:sym typeface="Arial"/>
+              </a:rPr>
+              <a:t>statistically</a:t>
+            </a:r>
+            <a:r>
+              <a:rPr lang="en-US" sz="3000">
+                <a:solidFill>
+                  <a:schemeClr val="dk1"/>
+                </a:solidFill>
+                <a:latin typeface="Arial"/>
+                <a:ea typeface="Arial"/>
+                <a:cs typeface="Arial"/>
+                <a:sym typeface="Arial"/>
+              </a:rPr>
+              <a:t> </a:t>
+            </a:r>
+            <a:r>
+              <a:rPr lang="en-US" sz="3000">
+                <a:solidFill>
+                  <a:schemeClr val="dk1"/>
+                </a:solidFill>
+                <a:latin typeface="Arial"/>
+                <a:ea typeface="Arial"/>
+                <a:cs typeface="Arial"/>
+                <a:sym typeface="Arial"/>
+              </a:rPr>
+              <a:t>insignificant, we fail to reject our null hypothesis, indicating AI companies in general are not different from the indices. Specific companies like Nvidia may not adhere to this generalization.</a:t>
+            </a:r>
+            <a:endParaRPr b="1">
+              <a:solidFill>
+                <a:schemeClr val="dk1"/>
+              </a:solidFill>
+            </a:endParaRPr>
+          </a:p>
+        </p:txBody>
+      </p:sp>
+      <p:sp>
+        <p:nvSpPr>
+          <p:cNvPr id="241" name="Google Shape;241;p15"/>
+          <p:cNvSpPr txBox="1"/>
+          <p:nvPr>
             <p:ph type="title"/>
           </p:nvPr>
         </p:nvSpPr>
         <p:spPr>
           <a:xfrm>
-            <a:off x="779406" y="467875"/>
-            <a:ext cx="10213800" cy="682800"/>
+            <a:off x="779400" y="251675"/>
+            <a:ext cx="10213800" cy="681600"/>
           </a:xfrm>
           <a:prstGeom prst="rect">
             <a:avLst/>
@@ -18684,98 +18828,6 @@
               <a:t>Conclusion</a:t>
             </a:r>
             <a:endParaRPr b="1"/>
-          </a:p>
-        </p:txBody>
-      </p:sp>
-      <p:sp>
-        <p:nvSpPr>
-          <p:cNvPr id="241" name="Google Shape;241;p15"/>
-          <p:cNvSpPr txBox="1"/>
-          <p:nvPr>
-            <p:ph idx="1" type="body"/>
-          </p:nvPr>
-        </p:nvSpPr>
-        <p:spPr>
-          <a:xfrm>
-            <a:off x="905250" y="1205926"/>
-            <a:ext cx="10381500" cy="5071800"/>
-          </a:xfrm>
-          <a:prstGeom prst="rect">
-            <a:avLst/>
-          </a:prstGeom>
-          <a:solidFill>
-            <a:srgbClr val="F7DBB9"/>
-          </a:solidFill>
-          <a:ln>
-            <a:noFill/>
-          </a:ln>
-        </p:spPr>
-        <p:txBody>
-          <a:bodyPr anchorCtr="0" anchor="ctr" bIns="45700" lIns="91425" spcFirstLastPara="1" rIns="91425" wrap="square" tIns="45700">
-            <a:normAutofit/>
-          </a:bodyPr>
-          <a:lstStyle/>
-          <a:p>
-            <a:pPr indent="0" lvl="0" marL="0" rtl="0" algn="ctr">
-              <a:lnSpc>
-                <a:spcPct val="150000"/>
-              </a:lnSpc>
-              <a:spcBef>
-                <a:spcPts val="1200"/>
-              </a:spcBef>
-              <a:spcAft>
-                <a:spcPts val="0"/>
-              </a:spcAft>
-              <a:buClr>
-                <a:schemeClr val="dk1"/>
-              </a:buClr>
-              <a:buSzPts val="1100"/>
-              <a:buFont typeface="Arial"/>
-              <a:buNone/>
-            </a:pPr>
-            <a:r>
-              <a:rPr lang="en-US" sz="3000">
-                <a:solidFill>
-                  <a:schemeClr val="dk1"/>
-                </a:solidFill>
-                <a:latin typeface="Arial"/>
-                <a:ea typeface="Arial"/>
-                <a:cs typeface="Arial"/>
-                <a:sym typeface="Arial"/>
-              </a:rPr>
-              <a:t>Our analysis shows that while AI companies have strong returns and high volatility, they don't show consistent or statistically significant outperformance or lower risk compared to the S&amp;P 500 and Dow Jones indexes. So, we are rejecting our null hypothesis.</a:t>
-            </a:r>
-            <a:endParaRPr sz="3000">
-              <a:solidFill>
-                <a:schemeClr val="dk1"/>
-              </a:solidFill>
-              <a:latin typeface="Arial"/>
-              <a:ea typeface="Arial"/>
-              <a:cs typeface="Arial"/>
-              <a:sym typeface="Arial"/>
-            </a:endParaRPr>
-          </a:p>
-          <a:p>
-            <a:pPr indent="0" lvl="0" marL="0" rtl="0" algn="ctr">
-              <a:lnSpc>
-                <a:spcPct val="125000"/>
-              </a:lnSpc>
-              <a:spcBef>
-                <a:spcPts val="1000"/>
-              </a:spcBef>
-              <a:spcAft>
-                <a:spcPts val="0"/>
-              </a:spcAft>
-              <a:buNone/>
-            </a:pPr>
-            <a:r>
-              <a:t/>
-            </a:r>
-            <a:endParaRPr b="1">
-              <a:solidFill>
-                <a:schemeClr val="dk1"/>
-              </a:solidFill>
-            </a:endParaRPr>
           </a:p>
         </p:txBody>
       </p:sp>
@@ -22397,10 +22449,6 @@
               <a:buNone/>
             </a:pPr>
             <a:r>
-              <a:rPr b="1" lang="en-US" sz="3600"/>
-              <a:t>Step 7: </a:t>
-            </a:r>
-            <a:r>
               <a:rPr b="1" lang="en-US" sz="3600">
                 <a:extLst>
                   <a:ext uri="http://customooxmlschemas.google.com/">
@@ -22829,7 +22877,7 @@
                   <a:srgbClr val="000000"/>
                 </a:solidFill>
               </a:rPr>
-              <a:t>Does the growth of AI stocks in the last 5 years suggest that investing in these companies is significantly more profitable than investing in most other companies based on the market indexes?</a:t>
+              <a:t>Does the growth of AI stocks in the last 5 years suggest that investing in these companies is significantly more profitable than investing in most other companies based on the market indices?</a:t>
             </a:r>
             <a:endParaRPr sz="1600">
               <a:solidFill>
@@ -22888,7 +22936,7 @@
                   <a:srgbClr val="000000"/>
                 </a:solidFill>
               </a:rPr>
-              <a:t>If I invest in the top AI companies, then I will see better profit compared to the market indexes, because there is a significant difference in the growth of these stocks and the market indexes.</a:t>
+              <a:t>If I invest in the top AI companies, then I will see better profit compared to the market indices, because there is a significant difference in the growth of these stocks and the market indices.</a:t>
             </a:r>
             <a:endParaRPr sz="1600">
               <a:solidFill>
@@ -22947,7 +22995,7 @@
                   <a:schemeClr val="dk1"/>
                 </a:solidFill>
               </a:rPr>
-              <a:t>There is no significant difference between the growth of AI stocks and the market indexes, as determined by average daily return year over year from 2019-2024, as compared to the S&amp;P 500 or DOW.</a:t>
+              <a:t>There is no significant difference between the growth of AI stocks and the market indices, as determined by average daily return year over year from 2019-2024, as compared to the S&amp;P 500 or DOW.</a:t>
             </a:r>
             <a:endParaRPr sz="1600">
               <a:solidFill>
@@ -23006,7 +23054,7 @@
                   <a:schemeClr val="dk1"/>
                 </a:solidFill>
               </a:rPr>
-              <a:t>There is a significant difference between the growth of AI stocks and the market indexes as determined by average daily return year over year from 2019-2024, as compared to S&amp;P 500 or DOW.</a:t>
+              <a:t>There is a significant difference between the growth of AI stocks and the market indices as determined by average daily return year over year from 2019-2024, as compared to S&amp;P 500 or DOW.</a:t>
             </a:r>
             <a:endParaRPr sz="1600">
               <a:solidFill>

</xml_diff>

<commit_message>
adjusted perferred profession names
</commit_message>
<xml_diff>
--- a/AIStocksProject/Presentation-Tech Giants Face-Off - Group 3.pptx
+++ b/AIStocksProject/Presentation-Tech Giants Face-Off - Group 3.pptx
@@ -14171,7 +14171,7 @@
                 <a:cs typeface="Avenir"/>
                 <a:sym typeface="Avenir"/>
               </a:rPr>
-              <a:t>Presentation by: Nate S., Andrea M. Dante P., Sabrina L, Melissa G, and Krissy K.</a:t>
+              <a:t>Presentation by: Nate S., Andrea M. Dante P., Sabrina L., Melissa G., and Krissy K.</a:t>
             </a:r>
             <a:endParaRPr sz="2600">
               <a:solidFill>
@@ -16318,7 +16318,7 @@
             <a:tbl>
               <a:tblPr>
                 <a:noFill/>
-                <a:tableStyleId>{D1C5A9A2-9897-45D0-B2BE-17C51DF6B12C}</a:tableStyleId>
+                <a:tableStyleId>{5E4A0808-236A-4024-AA36-770B3121F0DB}</a:tableStyleId>
               </a:tblPr>
               <a:tblGrid>
                 <a:gridCol w="3162925"/>
@@ -17427,7 +17427,7 @@
             <a:tbl>
               <a:tblPr>
                 <a:noFill/>
-                <a:tableStyleId>{D1C5A9A2-9897-45D0-B2BE-17C51DF6B12C}</a:tableStyleId>
+                <a:tableStyleId>{5E4A0808-236A-4024-AA36-770B3121F0DB}</a:tableStyleId>
               </a:tblPr>
               <a:tblGrid>
                 <a:gridCol w="2571750"/>
@@ -26331,6 +26331,285 @@
 </file>
 
 <file path=ppt/theme/theme1.xml><?xml version="1.0" encoding="utf-8"?>
+<a:theme xmlns:a="http://schemas.openxmlformats.org/drawingml/2006/main" xmlns:r="http://schemas.openxmlformats.org/officeDocument/2006/relationships" name="PebbleVTI">
+  <a:themeElements>
+    <a:clrScheme name="Blush 3">
+      <a:dk1>
+        <a:srgbClr val="000000"/>
+      </a:dk1>
+      <a:lt1>
+        <a:srgbClr val="FFFFFF"/>
+      </a:lt1>
+      <a:dk2>
+        <a:srgbClr val="B15E4E"/>
+      </a:dk2>
+      <a:lt2>
+        <a:srgbClr val="FFFFFF"/>
+      </a:lt2>
+      <a:accent1>
+        <a:srgbClr val="C5B096"/>
+      </a:accent1>
+      <a:accent2>
+        <a:srgbClr val="ECA855"/>
+      </a:accent2>
+      <a:accent3>
+        <a:srgbClr val="9BBFB0"/>
+      </a:accent3>
+      <a:accent4>
+        <a:srgbClr val="A9AEA7"/>
+      </a:accent4>
+      <a:accent5>
+        <a:srgbClr val="6A787C"/>
+      </a:accent5>
+      <a:accent6>
+        <a:srgbClr val="3B4345"/>
+      </a:accent6>
+      <a:hlink>
+        <a:srgbClr val="ECA855"/>
+      </a:hlink>
+      <a:folHlink>
+        <a:srgbClr val="6A392F"/>
+      </a:folHlink>
+    </a:clrScheme>
+    <a:fontScheme name="Office">
+      <a:majorFont>
+        <a:latin typeface="Arial"/>
+        <a:ea typeface=""/>
+        <a:cs typeface=""/>
+        <a:font script="Jpan" typeface="ＭＳ Ｐゴシック"/>
+        <a:font script="Hang" typeface="맑은 고딕"/>
+        <a:font script="Hans" typeface="宋体"/>
+        <a:font script="Hant" typeface="新細明體"/>
+        <a:font script="Arab" typeface="Times New Roman"/>
+        <a:font script="Hebr" typeface="Times New Roman"/>
+        <a:font script="Thai" typeface="Angsana New"/>
+        <a:font script="Ethi" typeface="Nyala"/>
+        <a:font script="Beng" typeface="Vrinda"/>
+        <a:font script="Gujr" typeface="Shruti"/>
+        <a:font script="Khmr" typeface="MoolBoran"/>
+        <a:font script="Knda" typeface="Tunga"/>
+        <a:font script="Guru" typeface="Raavi"/>
+        <a:font script="Cans" typeface="Euphemia"/>
+        <a:font script="Cher" typeface="Plantagenet Cherokee"/>
+        <a:font script="Yiii" typeface="Microsoft Yi Baiti"/>
+        <a:font script="Tibt" typeface="Microsoft Himalaya"/>
+        <a:font script="Thaa" typeface="MV Boli"/>
+        <a:font script="Deva" typeface="Mangal"/>
+        <a:font script="Telu" typeface="Gautami"/>
+        <a:font script="Taml" typeface="Latha"/>
+        <a:font script="Syrc" typeface="Estrangelo Edessa"/>
+        <a:font script="Orya" typeface="Kalinga"/>
+        <a:font script="Mlym" typeface="Kartika"/>
+        <a:font script="Laoo" typeface="DokChampa"/>
+        <a:font script="Sinh" typeface="Iskoola Pota"/>
+        <a:font script="Mong" typeface="Mongolian Baiti"/>
+        <a:font script="Viet" typeface="Times New Roman"/>
+        <a:font script="Uigh" typeface="Microsoft Uighur"/>
+        <a:font script="Geor" typeface="Sylfaen"/>
+      </a:majorFont>
+      <a:minorFont>
+        <a:latin typeface="Arial"/>
+        <a:ea typeface=""/>
+        <a:cs typeface=""/>
+        <a:font script="Jpan" typeface="ＭＳ Ｐゴシック"/>
+        <a:font script="Hang" typeface="맑은 고딕"/>
+        <a:font script="Hans" typeface="宋体"/>
+        <a:font script="Hant" typeface="新細明體"/>
+        <a:font script="Arab" typeface="Arial"/>
+        <a:font script="Hebr" typeface="Arial"/>
+        <a:font script="Thai" typeface="Cordia New"/>
+        <a:font script="Ethi" typeface="Nyala"/>
+        <a:font script="Beng" typeface="Vrinda"/>
+        <a:font script="Gujr" typeface="Shruti"/>
+        <a:font script="Khmr" typeface="DaunPenh"/>
+        <a:font script="Knda" typeface="Tunga"/>
+        <a:font script="Guru" typeface="Raavi"/>
+        <a:font script="Cans" typeface="Euphemia"/>
+        <a:font script="Cher" typeface="Plantagenet Cherokee"/>
+        <a:font script="Yiii" typeface="Microsoft Yi Baiti"/>
+        <a:font script="Tibt" typeface="Microsoft Himalaya"/>
+        <a:font script="Thaa" typeface="MV Boli"/>
+        <a:font script="Deva" typeface="Mangal"/>
+        <a:font script="Telu" typeface="Gautami"/>
+        <a:font script="Taml" typeface="Latha"/>
+        <a:font script="Syrc" typeface="Estrangelo Edessa"/>
+        <a:font script="Orya" typeface="Kalinga"/>
+        <a:font script="Mlym" typeface="Kartika"/>
+        <a:font script="Laoo" typeface="DokChampa"/>
+        <a:font script="Sinh" typeface="Iskoola Pota"/>
+        <a:font script="Mong" typeface="Mongolian Baiti"/>
+        <a:font script="Viet" typeface="Arial"/>
+        <a:font script="Uigh" typeface="Microsoft Uighur"/>
+        <a:font script="Geor" typeface="Sylfaen"/>
+      </a:minorFont>
+    </a:fontScheme>
+    <a:fmtScheme name="Office">
+      <a:fillStyleLst>
+        <a:solidFill>
+          <a:schemeClr val="phClr"/>
+        </a:solidFill>
+        <a:gradFill rotWithShape="1">
+          <a:gsLst>
+            <a:gs pos="0">
+              <a:schemeClr val="phClr">
+                <a:tint val="50000"/>
+                <a:satMod val="300000"/>
+              </a:schemeClr>
+            </a:gs>
+            <a:gs pos="35000">
+              <a:schemeClr val="phClr">
+                <a:tint val="37000"/>
+                <a:satMod val="300000"/>
+              </a:schemeClr>
+            </a:gs>
+            <a:gs pos="100000">
+              <a:schemeClr val="phClr">
+                <a:tint val="15000"/>
+                <a:satMod val="350000"/>
+              </a:schemeClr>
+            </a:gs>
+          </a:gsLst>
+          <a:lin ang="16200000" scaled="1"/>
+        </a:gradFill>
+        <a:gradFill rotWithShape="1">
+          <a:gsLst>
+            <a:gs pos="0">
+              <a:schemeClr val="phClr">
+                <a:tint val="100000"/>
+                <a:shade val="100000"/>
+                <a:satMod val="130000"/>
+              </a:schemeClr>
+            </a:gs>
+            <a:gs pos="100000">
+              <a:schemeClr val="phClr">
+                <a:tint val="50000"/>
+                <a:shade val="100000"/>
+                <a:satMod val="350000"/>
+              </a:schemeClr>
+            </a:gs>
+          </a:gsLst>
+          <a:lin ang="16200000" scaled="0"/>
+        </a:gradFill>
+      </a:fillStyleLst>
+      <a:lnStyleLst>
+        <a:ln w="9525" cap="flat" cmpd="sng" algn="ctr">
+          <a:solidFill>
+            <a:schemeClr val="phClr">
+              <a:shade val="95000"/>
+              <a:satMod val="105000"/>
+            </a:schemeClr>
+          </a:solidFill>
+          <a:prstDash val="solid"/>
+        </a:ln>
+        <a:ln w="25400" cap="flat" cmpd="sng" algn="ctr">
+          <a:solidFill>
+            <a:schemeClr val="phClr"/>
+          </a:solidFill>
+          <a:prstDash val="solid"/>
+        </a:ln>
+        <a:ln w="38100" cap="flat" cmpd="sng" algn="ctr">
+          <a:solidFill>
+            <a:schemeClr val="phClr"/>
+          </a:solidFill>
+          <a:prstDash val="solid"/>
+        </a:ln>
+      </a:lnStyleLst>
+      <a:effectStyleLst>
+        <a:effectStyle>
+          <a:effectLst>
+            <a:outerShdw blurRad="40000" dist="20000" dir="5400000" rotWithShape="0">
+              <a:srgbClr val="000000">
+                <a:alpha val="38000"/>
+              </a:srgbClr>
+            </a:outerShdw>
+          </a:effectLst>
+        </a:effectStyle>
+        <a:effectStyle>
+          <a:effectLst>
+            <a:outerShdw blurRad="40000" dist="23000" dir="5400000" rotWithShape="0">
+              <a:srgbClr val="000000">
+                <a:alpha val="35000"/>
+              </a:srgbClr>
+            </a:outerShdw>
+          </a:effectLst>
+        </a:effectStyle>
+        <a:effectStyle>
+          <a:effectLst>
+            <a:outerShdw blurRad="40000" dist="23000" dir="5400000" rotWithShape="0">
+              <a:srgbClr val="000000">
+                <a:alpha val="35000"/>
+              </a:srgbClr>
+            </a:outerShdw>
+          </a:effectLst>
+          <a:scene3d>
+            <a:camera prst="orthographicFront">
+              <a:rot lat="0" lon="0" rev="0"/>
+            </a:camera>
+            <a:lightRig rig="threePt" dir="t">
+              <a:rot lat="0" lon="0" rev="1200000"/>
+            </a:lightRig>
+          </a:scene3d>
+          <a:sp3d>
+            <a:bevelT w="63500" h="25400"/>
+          </a:sp3d>
+        </a:effectStyle>
+      </a:effectStyleLst>
+      <a:bgFillStyleLst>
+        <a:solidFill>
+          <a:schemeClr val="phClr"/>
+        </a:solidFill>
+        <a:gradFill rotWithShape="1">
+          <a:gsLst>
+            <a:gs pos="0">
+              <a:schemeClr val="phClr">
+                <a:tint val="40000"/>
+                <a:satMod val="350000"/>
+              </a:schemeClr>
+            </a:gs>
+            <a:gs pos="40000">
+              <a:schemeClr val="phClr">
+                <a:tint val="45000"/>
+                <a:shade val="99000"/>
+                <a:satMod val="350000"/>
+              </a:schemeClr>
+            </a:gs>
+            <a:gs pos="100000">
+              <a:schemeClr val="phClr">
+                <a:shade val="20000"/>
+                <a:satMod val="255000"/>
+              </a:schemeClr>
+            </a:gs>
+          </a:gsLst>
+          <a:path path="circle">
+            <a:fillToRect l="50000" t="-80000" r="50000" b="180000"/>
+          </a:path>
+        </a:gradFill>
+        <a:gradFill rotWithShape="1">
+          <a:gsLst>
+            <a:gs pos="0">
+              <a:schemeClr val="phClr">
+                <a:tint val="80000"/>
+                <a:satMod val="300000"/>
+              </a:schemeClr>
+            </a:gs>
+            <a:gs pos="100000">
+              <a:schemeClr val="phClr">
+                <a:shade val="30000"/>
+                <a:satMod val="200000"/>
+              </a:schemeClr>
+            </a:gs>
+          </a:gsLst>
+          <a:path path="circle">
+            <a:fillToRect l="50000" t="50000" r="50000" b="50000"/>
+          </a:path>
+        </a:gradFill>
+      </a:bgFillStyleLst>
+    </a:fmtScheme>
+  </a:themeElements>
+</a:theme>
+</file>
+
+<file path=ppt/theme/theme2.xml><?xml version="1.0" encoding="utf-8"?>
 <a:theme xmlns:a="http://schemas.openxmlformats.org/drawingml/2006/main" xmlns:r="http://schemas.openxmlformats.org/officeDocument/2006/relationships">
   <a:themeElements>
     <a:clrScheme name="Default">
@@ -26607,283 +26886,4 @@
     </a:fmtScheme>
   </a:themeElements>
 </a:theme>
-</file>
-
-<file path=ppt/theme/theme2.xml><?xml version="1.0" encoding="utf-8"?>
-<a:theme xmlns:a="http://schemas.openxmlformats.org/drawingml/2006/main" xmlns:r="http://schemas.openxmlformats.org/officeDocument/2006/relationships" name="PebbleVTI">
-  <a:themeElements>
-    <a:clrScheme name="Blush 3">
-      <a:dk1>
-        <a:srgbClr val="000000"/>
-      </a:dk1>
-      <a:lt1>
-        <a:srgbClr val="FFFFFF"/>
-      </a:lt1>
-      <a:dk2>
-        <a:srgbClr val="B15E4E"/>
-      </a:dk2>
-      <a:lt2>
-        <a:srgbClr val="FFFFFF"/>
-      </a:lt2>
-      <a:accent1>
-        <a:srgbClr val="C5B096"/>
-      </a:accent1>
-      <a:accent2>
-        <a:srgbClr val="ECA855"/>
-      </a:accent2>
-      <a:accent3>
-        <a:srgbClr val="9BBFB0"/>
-      </a:accent3>
-      <a:accent4>
-        <a:srgbClr val="A9AEA7"/>
-      </a:accent4>
-      <a:accent5>
-        <a:srgbClr val="6A787C"/>
-      </a:accent5>
-      <a:accent6>
-        <a:srgbClr val="3B4345"/>
-      </a:accent6>
-      <a:hlink>
-        <a:srgbClr val="ECA855"/>
-      </a:hlink>
-      <a:folHlink>
-        <a:srgbClr val="6A392F"/>
-      </a:folHlink>
-    </a:clrScheme>
-    <a:fontScheme name="Office">
-      <a:majorFont>
-        <a:latin typeface="Arial"/>
-        <a:ea typeface=""/>
-        <a:cs typeface=""/>
-        <a:font script="Jpan" typeface="ＭＳ Ｐゴシック"/>
-        <a:font script="Hang" typeface="맑은 고딕"/>
-        <a:font script="Hans" typeface="宋体"/>
-        <a:font script="Hant" typeface="新細明體"/>
-        <a:font script="Arab" typeface="Times New Roman"/>
-        <a:font script="Hebr" typeface="Times New Roman"/>
-        <a:font script="Thai" typeface="Angsana New"/>
-        <a:font script="Ethi" typeface="Nyala"/>
-        <a:font script="Beng" typeface="Vrinda"/>
-        <a:font script="Gujr" typeface="Shruti"/>
-        <a:font script="Khmr" typeface="MoolBoran"/>
-        <a:font script="Knda" typeface="Tunga"/>
-        <a:font script="Guru" typeface="Raavi"/>
-        <a:font script="Cans" typeface="Euphemia"/>
-        <a:font script="Cher" typeface="Plantagenet Cherokee"/>
-        <a:font script="Yiii" typeface="Microsoft Yi Baiti"/>
-        <a:font script="Tibt" typeface="Microsoft Himalaya"/>
-        <a:font script="Thaa" typeface="MV Boli"/>
-        <a:font script="Deva" typeface="Mangal"/>
-        <a:font script="Telu" typeface="Gautami"/>
-        <a:font script="Taml" typeface="Latha"/>
-        <a:font script="Syrc" typeface="Estrangelo Edessa"/>
-        <a:font script="Orya" typeface="Kalinga"/>
-        <a:font script="Mlym" typeface="Kartika"/>
-        <a:font script="Laoo" typeface="DokChampa"/>
-        <a:font script="Sinh" typeface="Iskoola Pota"/>
-        <a:font script="Mong" typeface="Mongolian Baiti"/>
-        <a:font script="Viet" typeface="Times New Roman"/>
-        <a:font script="Uigh" typeface="Microsoft Uighur"/>
-        <a:font script="Geor" typeface="Sylfaen"/>
-      </a:majorFont>
-      <a:minorFont>
-        <a:latin typeface="Arial"/>
-        <a:ea typeface=""/>
-        <a:cs typeface=""/>
-        <a:font script="Jpan" typeface="ＭＳ Ｐゴシック"/>
-        <a:font script="Hang" typeface="맑은 고딕"/>
-        <a:font script="Hans" typeface="宋体"/>
-        <a:font script="Hant" typeface="新細明體"/>
-        <a:font script="Arab" typeface="Arial"/>
-        <a:font script="Hebr" typeface="Arial"/>
-        <a:font script="Thai" typeface="Cordia New"/>
-        <a:font script="Ethi" typeface="Nyala"/>
-        <a:font script="Beng" typeface="Vrinda"/>
-        <a:font script="Gujr" typeface="Shruti"/>
-        <a:font script="Khmr" typeface="DaunPenh"/>
-        <a:font script="Knda" typeface="Tunga"/>
-        <a:font script="Guru" typeface="Raavi"/>
-        <a:font script="Cans" typeface="Euphemia"/>
-        <a:font script="Cher" typeface="Plantagenet Cherokee"/>
-        <a:font script="Yiii" typeface="Microsoft Yi Baiti"/>
-        <a:font script="Tibt" typeface="Microsoft Himalaya"/>
-        <a:font script="Thaa" typeface="MV Boli"/>
-        <a:font script="Deva" typeface="Mangal"/>
-        <a:font script="Telu" typeface="Gautami"/>
-        <a:font script="Taml" typeface="Latha"/>
-        <a:font script="Syrc" typeface="Estrangelo Edessa"/>
-        <a:font script="Orya" typeface="Kalinga"/>
-        <a:font script="Mlym" typeface="Kartika"/>
-        <a:font script="Laoo" typeface="DokChampa"/>
-        <a:font script="Sinh" typeface="Iskoola Pota"/>
-        <a:font script="Mong" typeface="Mongolian Baiti"/>
-        <a:font script="Viet" typeface="Arial"/>
-        <a:font script="Uigh" typeface="Microsoft Uighur"/>
-        <a:font script="Geor" typeface="Sylfaen"/>
-      </a:minorFont>
-    </a:fontScheme>
-    <a:fmtScheme name="Office">
-      <a:fillStyleLst>
-        <a:solidFill>
-          <a:schemeClr val="phClr"/>
-        </a:solidFill>
-        <a:gradFill rotWithShape="1">
-          <a:gsLst>
-            <a:gs pos="0">
-              <a:schemeClr val="phClr">
-                <a:tint val="50000"/>
-                <a:satMod val="300000"/>
-              </a:schemeClr>
-            </a:gs>
-            <a:gs pos="35000">
-              <a:schemeClr val="phClr">
-                <a:tint val="37000"/>
-                <a:satMod val="300000"/>
-              </a:schemeClr>
-            </a:gs>
-            <a:gs pos="100000">
-              <a:schemeClr val="phClr">
-                <a:tint val="15000"/>
-                <a:satMod val="350000"/>
-              </a:schemeClr>
-            </a:gs>
-          </a:gsLst>
-          <a:lin ang="16200000" scaled="1"/>
-        </a:gradFill>
-        <a:gradFill rotWithShape="1">
-          <a:gsLst>
-            <a:gs pos="0">
-              <a:schemeClr val="phClr">
-                <a:tint val="100000"/>
-                <a:shade val="100000"/>
-                <a:satMod val="130000"/>
-              </a:schemeClr>
-            </a:gs>
-            <a:gs pos="100000">
-              <a:schemeClr val="phClr">
-                <a:tint val="50000"/>
-                <a:shade val="100000"/>
-                <a:satMod val="350000"/>
-              </a:schemeClr>
-            </a:gs>
-          </a:gsLst>
-          <a:lin ang="16200000" scaled="0"/>
-        </a:gradFill>
-      </a:fillStyleLst>
-      <a:lnStyleLst>
-        <a:ln w="9525" cap="flat" cmpd="sng" algn="ctr">
-          <a:solidFill>
-            <a:schemeClr val="phClr">
-              <a:shade val="95000"/>
-              <a:satMod val="105000"/>
-            </a:schemeClr>
-          </a:solidFill>
-          <a:prstDash val="solid"/>
-        </a:ln>
-        <a:ln w="25400" cap="flat" cmpd="sng" algn="ctr">
-          <a:solidFill>
-            <a:schemeClr val="phClr"/>
-          </a:solidFill>
-          <a:prstDash val="solid"/>
-        </a:ln>
-        <a:ln w="38100" cap="flat" cmpd="sng" algn="ctr">
-          <a:solidFill>
-            <a:schemeClr val="phClr"/>
-          </a:solidFill>
-          <a:prstDash val="solid"/>
-        </a:ln>
-      </a:lnStyleLst>
-      <a:effectStyleLst>
-        <a:effectStyle>
-          <a:effectLst>
-            <a:outerShdw blurRad="40000" dist="20000" dir="5400000" rotWithShape="0">
-              <a:srgbClr val="000000">
-                <a:alpha val="38000"/>
-              </a:srgbClr>
-            </a:outerShdw>
-          </a:effectLst>
-        </a:effectStyle>
-        <a:effectStyle>
-          <a:effectLst>
-            <a:outerShdw blurRad="40000" dist="23000" dir="5400000" rotWithShape="0">
-              <a:srgbClr val="000000">
-                <a:alpha val="35000"/>
-              </a:srgbClr>
-            </a:outerShdw>
-          </a:effectLst>
-        </a:effectStyle>
-        <a:effectStyle>
-          <a:effectLst>
-            <a:outerShdw blurRad="40000" dist="23000" dir="5400000" rotWithShape="0">
-              <a:srgbClr val="000000">
-                <a:alpha val="35000"/>
-              </a:srgbClr>
-            </a:outerShdw>
-          </a:effectLst>
-          <a:scene3d>
-            <a:camera prst="orthographicFront">
-              <a:rot lat="0" lon="0" rev="0"/>
-            </a:camera>
-            <a:lightRig rig="threePt" dir="t">
-              <a:rot lat="0" lon="0" rev="1200000"/>
-            </a:lightRig>
-          </a:scene3d>
-          <a:sp3d>
-            <a:bevelT w="63500" h="25400"/>
-          </a:sp3d>
-        </a:effectStyle>
-      </a:effectStyleLst>
-      <a:bgFillStyleLst>
-        <a:solidFill>
-          <a:schemeClr val="phClr"/>
-        </a:solidFill>
-        <a:gradFill rotWithShape="1">
-          <a:gsLst>
-            <a:gs pos="0">
-              <a:schemeClr val="phClr">
-                <a:tint val="40000"/>
-                <a:satMod val="350000"/>
-              </a:schemeClr>
-            </a:gs>
-            <a:gs pos="40000">
-              <a:schemeClr val="phClr">
-                <a:tint val="45000"/>
-                <a:shade val="99000"/>
-                <a:satMod val="350000"/>
-              </a:schemeClr>
-            </a:gs>
-            <a:gs pos="100000">
-              <a:schemeClr val="phClr">
-                <a:shade val="20000"/>
-                <a:satMod val="255000"/>
-              </a:schemeClr>
-            </a:gs>
-          </a:gsLst>
-          <a:path path="circle">
-            <a:fillToRect l="50000" t="-80000" r="50000" b="180000"/>
-          </a:path>
-        </a:gradFill>
-        <a:gradFill rotWithShape="1">
-          <a:gsLst>
-            <a:gs pos="0">
-              <a:schemeClr val="phClr">
-                <a:tint val="80000"/>
-                <a:satMod val="300000"/>
-              </a:schemeClr>
-            </a:gs>
-            <a:gs pos="100000">
-              <a:schemeClr val="phClr">
-                <a:shade val="30000"/>
-                <a:satMod val="200000"/>
-              </a:schemeClr>
-            </a:gs>
-          </a:gsLst>
-          <a:path path="circle">
-            <a:fillToRect l="50000" t="50000" r="50000" b="50000"/>
-          </a:path>
-        </a:gradFill>
-      </a:bgFillStyleLst>
-    </a:fmtScheme>
-  </a:themeElements>
-</a:theme>
 </file>
</xml_diff>